<commit_message>
falta só por o diagrama de Gantt
</commit_message>
<xml_diff>
--- a/Apresentação/ARIT-MAT.pptx
+++ b/Apresentação/ARIT-MAT.pptx
@@ -116,6 +116,11 @@
       </a:defRPr>
     </a:lvl9pPr>
   </p:defaultTextStyle>
+  <p:extLst>
+    <p:ext uri="{EFAFB233-063F-42B5-8137-9DF3F51BA10A}">
+      <p15:sldGuideLst xmlns:p15="http://schemas.microsoft.com/office/powerpoint/2012/main"/>
+    </p:ext>
+  </p:extLst>
 </p:presentation>
 </file>
 
@@ -540,11 +545,7 @@
             </a:r>
             <a:r>
               <a:rPr lang="pt-PT" baseline="0" dirty="0" smtClean="0"/>
-              <a:t> desenvolvimento de um assistente pedagógico</a:t>
-            </a:r>
-            <a:r>
-              <a:rPr lang="pt-PT" baseline="0" dirty="0" smtClean="0"/>
-              <a:t>, foi matemática, mais concretamente, adições e subtrações dada a sua simplicidade e ao mesmo tempo elevada importância e utilidade. </a:t>
+              <a:t> desenvolvimento de um assistente pedagógico, foi matemática, mais concretamente, adições e subtrações dada a sua simplicidade e ao mesmo tempo elevada importância e utilidade. </a:t>
             </a:r>
           </a:p>
         </p:txBody>
@@ -976,6 +977,210 @@
     <p:extLst>
       <p:ext uri="{BB962C8B-B14F-4D97-AF65-F5344CB8AC3E}">
         <p14:creationId xmlns:p14="http://schemas.microsoft.com/office/powerpoint/2010/main" val="1616434669"/>
+      </p:ext>
+    </p:extLst>
+  </p:cSld>
+  <p:clrMapOvr>
+    <a:masterClrMapping/>
+  </p:clrMapOvr>
+</p:notes>
+</file>
+
+<file path=ppt/notesSlides/notesSlide6.xml><?xml version="1.0" encoding="utf-8"?>
+<p:notes xmlns:a="http://schemas.openxmlformats.org/drawingml/2006/main" xmlns:r="http://schemas.openxmlformats.org/officeDocument/2006/relationships" xmlns:p="http://schemas.openxmlformats.org/presentationml/2006/main">
+  <p:cSld>
+    <p:spTree>
+      <p:nvGrpSpPr>
+        <p:cNvPr id="1" name=""/>
+        <p:cNvGrpSpPr/>
+        <p:nvPr/>
+      </p:nvGrpSpPr>
+      <p:grpSpPr>
+        <a:xfrm>
+          <a:off x="0" y="0"/>
+          <a:ext cx="0" cy="0"/>
+          <a:chOff x="0" y="0"/>
+          <a:chExt cx="0" cy="0"/>
+        </a:xfrm>
+      </p:grpSpPr>
+      <p:sp>
+        <p:nvSpPr>
+          <p:cNvPr id="2" name="Espaço Reservado para Imagem de Slide 1"/>
+          <p:cNvSpPr>
+            <a:spLocks noGrp="1" noRot="1" noChangeAspect="1"/>
+          </p:cNvSpPr>
+          <p:nvPr>
+            <p:ph type="sldImg"/>
+          </p:nvPr>
+        </p:nvSpPr>
+        <p:spPr/>
+      </p:sp>
+      <p:sp>
+        <p:nvSpPr>
+          <p:cNvPr id="3" name="Espaço Reservado para Anotações 2"/>
+          <p:cNvSpPr>
+            <a:spLocks noGrp="1"/>
+          </p:cNvSpPr>
+          <p:nvPr>
+            <p:ph type="body" idx="1"/>
+          </p:nvPr>
+        </p:nvSpPr>
+        <p:spPr/>
+        <p:txBody>
+          <a:bodyPr/>
+          <a:lstStyle/>
+          <a:p>
+            <a:r>
+              <a:rPr lang="pt-PT" dirty="0" smtClean="0"/>
+              <a:t>De</a:t>
+            </a:r>
+            <a:r>
+              <a:rPr lang="pt-PT" baseline="0" dirty="0" smtClean="0"/>
+              <a:t> modo a especificar e com isso economizar tempo e melhorar o processo de desenvolvimento foi estruturado o seguinte diagrama de Gantt que, aproximadamente, descreve todas as fases do processo atribuindo-lhes um tempo estimado, isto é o que se espera conseguir ao longo do desenvolvimento do ARIT-MAT.</a:t>
+            </a:r>
+            <a:endParaRPr lang="pt-PT" dirty="0"/>
+          </a:p>
+        </p:txBody>
+      </p:sp>
+      <p:sp>
+        <p:nvSpPr>
+          <p:cNvPr id="4" name="Espaço Reservado para Número de Slide 3"/>
+          <p:cNvSpPr>
+            <a:spLocks noGrp="1"/>
+          </p:cNvSpPr>
+          <p:nvPr>
+            <p:ph type="sldNum" sz="quarter" idx="10"/>
+          </p:nvPr>
+        </p:nvSpPr>
+        <p:spPr/>
+        <p:txBody>
+          <a:bodyPr/>
+          <a:lstStyle/>
+          <a:p>
+            <a:fld id="{B1A75EE4-BF34-4748-90F2-2EA9573BBF4F}" type="slidenum">
+              <a:rPr lang="pt-PT" smtClean="0"/>
+              <a:t>8</a:t>
+            </a:fld>
+            <a:endParaRPr lang="pt-PT"/>
+          </a:p>
+        </p:txBody>
+      </p:sp>
+    </p:spTree>
+    <p:extLst>
+      <p:ext uri="{BB962C8B-B14F-4D97-AF65-F5344CB8AC3E}">
+        <p14:creationId xmlns:p14="http://schemas.microsoft.com/office/powerpoint/2010/main" val="2882787317"/>
+      </p:ext>
+    </p:extLst>
+  </p:cSld>
+  <p:clrMapOvr>
+    <a:masterClrMapping/>
+  </p:clrMapOvr>
+</p:notes>
+</file>
+
+<file path=ppt/notesSlides/notesSlide7.xml><?xml version="1.0" encoding="utf-8"?>
+<p:notes xmlns:a="http://schemas.openxmlformats.org/drawingml/2006/main" xmlns:r="http://schemas.openxmlformats.org/officeDocument/2006/relationships" xmlns:p="http://schemas.openxmlformats.org/presentationml/2006/main">
+  <p:cSld>
+    <p:spTree>
+      <p:nvGrpSpPr>
+        <p:cNvPr id="1" name=""/>
+        <p:cNvGrpSpPr/>
+        <p:nvPr/>
+      </p:nvGrpSpPr>
+      <p:grpSpPr>
+        <a:xfrm>
+          <a:off x="0" y="0"/>
+          <a:ext cx="0" cy="0"/>
+          <a:chOff x="0" y="0"/>
+          <a:chExt cx="0" cy="0"/>
+        </a:xfrm>
+      </p:grpSpPr>
+      <p:sp>
+        <p:nvSpPr>
+          <p:cNvPr id="2" name="Espaço Reservado para Imagem de Slide 1"/>
+          <p:cNvSpPr>
+            <a:spLocks noGrp="1" noRot="1" noChangeAspect="1"/>
+          </p:cNvSpPr>
+          <p:nvPr>
+            <p:ph type="sldImg"/>
+          </p:nvPr>
+        </p:nvSpPr>
+        <p:spPr/>
+      </p:sp>
+      <p:sp>
+        <p:nvSpPr>
+          <p:cNvPr id="3" name="Espaço Reservado para Anotações 2"/>
+          <p:cNvSpPr>
+            <a:spLocks noGrp="1"/>
+          </p:cNvSpPr>
+          <p:nvPr>
+            <p:ph type="body" idx="1"/>
+          </p:nvPr>
+        </p:nvSpPr>
+        <p:spPr/>
+        <p:txBody>
+          <a:bodyPr/>
+          <a:lstStyle/>
+          <a:p>
+            <a:r>
+              <a:rPr lang="pt-PT" dirty="0" smtClean="0"/>
+              <a:t>No final desta primeira etapa temos </a:t>
+            </a:r>
+            <a:r>
+              <a:rPr lang="pt-PT" smtClean="0"/>
+              <a:t>a salientar</a:t>
+            </a:r>
+            <a:r>
+              <a:rPr lang="pt-PT" baseline="0" smtClean="0"/>
+              <a:t> as dificuldades que </a:t>
+            </a:r>
+            <a:r>
+              <a:rPr lang="pt-PT" baseline="0" dirty="0" smtClean="0"/>
+              <a:t>se prendem em 2 pontos:</a:t>
+            </a:r>
+          </a:p>
+          <a:p>
+            <a:r>
+              <a:rPr lang="pt-PT" baseline="0" dirty="0" smtClean="0"/>
+              <a:t>1º: Encontrar um tema útil e propício ou adequado a este desafio, pois foi necessário “encaixar” todo o desenvolvimento num intervalo de tempo fixo e inalterável o que não permite demasiadas funcionalidades que seriam impossíveis de implementar de forma completa e bem desenvolvida num espaço tão curto.</a:t>
+            </a:r>
+          </a:p>
+          <a:p>
+            <a:r>
+              <a:rPr lang="pt-PT" baseline="0" dirty="0" smtClean="0"/>
+              <a:t>2º:Previsão usada para construir o diagrama de Gantt, pois dada a falta de experiência e contacto leva à imprecisão dos dados expostos que foram obtidos por estimativas e “palpites” sobre o que é conhecido.</a:t>
+            </a:r>
+            <a:endParaRPr lang="pt-PT" dirty="0"/>
+          </a:p>
+        </p:txBody>
+      </p:sp>
+      <p:sp>
+        <p:nvSpPr>
+          <p:cNvPr id="4" name="Espaço Reservado para Número de Slide 3"/>
+          <p:cNvSpPr>
+            <a:spLocks noGrp="1"/>
+          </p:cNvSpPr>
+          <p:nvPr>
+            <p:ph type="sldNum" sz="quarter" idx="10"/>
+          </p:nvPr>
+        </p:nvSpPr>
+        <p:spPr/>
+        <p:txBody>
+          <a:bodyPr/>
+          <a:lstStyle/>
+          <a:p>
+            <a:fld id="{B1A75EE4-BF34-4748-90F2-2EA9573BBF4F}" type="slidenum">
+              <a:rPr lang="pt-PT" smtClean="0"/>
+              <a:t>9</a:t>
+            </a:fld>
+            <a:endParaRPr lang="pt-PT"/>
+          </a:p>
+        </p:txBody>
+      </p:sp>
+    </p:spTree>
+    <p:extLst>
+      <p:ext uri="{BB962C8B-B14F-4D97-AF65-F5344CB8AC3E}">
+        <p14:creationId xmlns:p14="http://schemas.microsoft.com/office/powerpoint/2010/main" val="3525061599"/>
       </p:ext>
     </p:extLst>
   </p:cSld>
@@ -4954,34 +5159,7 @@
                 </a:solidFill>
                 <a:latin typeface="+mj-lt"/>
               </a:rPr>
-              <a:t>25 </a:t>
-            </a:r>
-            <a:r>
-              <a:rPr lang="pt-PT" sz="2000" spc="200" dirty="0" smtClean="0">
-                <a:solidFill>
-                  <a:schemeClr val="tx2"/>
-                </a:solidFill>
-                <a:latin typeface="+mj-lt"/>
-              </a:rPr>
-              <a:t>de </a:t>
-            </a:r>
-            <a:r>
-              <a:rPr lang="pt-PT" sz="2000" spc="200" dirty="0" smtClean="0">
-                <a:solidFill>
-                  <a:schemeClr val="tx2"/>
-                </a:solidFill>
-                <a:latin typeface="+mj-lt"/>
-              </a:rPr>
-              <a:t>Março </a:t>
-            </a:r>
-            <a:r>
-              <a:rPr lang="pt-PT" sz="2000" spc="200" dirty="0" smtClean="0">
-                <a:solidFill>
-                  <a:schemeClr val="tx2"/>
-                </a:solidFill>
-                <a:latin typeface="+mj-lt"/>
-              </a:rPr>
-              <a:t>de 2015</a:t>
+              <a:t>25 de Março de 2015</a:t>
             </a:r>
             <a:endParaRPr lang="pt-PT" sz="2000" spc="200" dirty="0">
               <a:solidFill>
@@ -5310,34 +5488,7 @@
                 </a:solidFill>
                 <a:latin typeface="+mj-lt"/>
               </a:rPr>
-              <a:t>25 </a:t>
-            </a:r>
-            <a:r>
-              <a:rPr lang="pt-PT" sz="2000" spc="200" dirty="0" smtClean="0">
-                <a:solidFill>
-                  <a:schemeClr val="tx2"/>
-                </a:solidFill>
-                <a:latin typeface="+mj-lt"/>
-              </a:rPr>
-              <a:t>de </a:t>
-            </a:r>
-            <a:r>
-              <a:rPr lang="pt-PT" sz="2000" spc="200" dirty="0" smtClean="0">
-                <a:solidFill>
-                  <a:schemeClr val="tx2"/>
-                </a:solidFill>
-                <a:latin typeface="+mj-lt"/>
-              </a:rPr>
-              <a:t>Março </a:t>
-            </a:r>
-            <a:r>
-              <a:rPr lang="pt-PT" sz="2000" spc="200" dirty="0" smtClean="0">
-                <a:solidFill>
-                  <a:schemeClr val="tx2"/>
-                </a:solidFill>
-                <a:latin typeface="+mj-lt"/>
-              </a:rPr>
-              <a:t>de 2015</a:t>
+              <a:t>25 de Março de 2015</a:t>
             </a:r>
             <a:endParaRPr lang="pt-PT" sz="2000" spc="200" dirty="0">
               <a:solidFill>
@@ -7648,6 +7799,122 @@
           <a:bodyPr/>
           <a:lstStyle/>
           <a:p>
+            <a:pPr marL="342900" lvl="1" indent="-342900">
+              <a:spcBef>
+                <a:spcPts val="1200"/>
+              </a:spcBef>
+              <a:spcAft>
+                <a:spcPts val="200"/>
+              </a:spcAft>
+              <a:buSzPct val="100000"/>
+              <a:buFont typeface="Arial" panose="020B0604020202020204" pitchFamily="34" charset="0"/>
+              <a:buChar char="•"/>
+            </a:pPr>
+            <a:endParaRPr lang="pt-PT" sz="2400" dirty="0" smtClean="0"/>
+          </a:p>
+          <a:p>
+            <a:pPr marL="342900" lvl="1" indent="-342900">
+              <a:spcBef>
+                <a:spcPts val="1200"/>
+              </a:spcBef>
+              <a:spcAft>
+                <a:spcPts val="200"/>
+              </a:spcAft>
+              <a:buSzPct val="100000"/>
+              <a:buFont typeface="Arial" panose="020B0604020202020204" pitchFamily="34" charset="0"/>
+              <a:buChar char="•"/>
+            </a:pPr>
+            <a:endParaRPr lang="pt-PT" sz="2400" dirty="0"/>
+          </a:p>
+          <a:p>
+            <a:pPr marL="342900" lvl="1" indent="-342900">
+              <a:spcBef>
+                <a:spcPts val="1200"/>
+              </a:spcBef>
+              <a:spcAft>
+                <a:spcPts val="200"/>
+              </a:spcAft>
+              <a:buSzPct val="100000"/>
+              <a:buFont typeface="Arial" panose="020B0604020202020204" pitchFamily="34" charset="0"/>
+              <a:buChar char="•"/>
+            </a:pPr>
+            <a:r>
+              <a:rPr lang="pt-PT" sz="2400" dirty="0" smtClean="0"/>
+              <a:t>Dificuldades</a:t>
+            </a:r>
+            <a:r>
+              <a:rPr lang="pt-PT" sz="2400" dirty="0"/>
+              <a:t>:</a:t>
+            </a:r>
+          </a:p>
+          <a:p>
+            <a:pPr marL="525780" lvl="2" indent="-342900">
+              <a:spcBef>
+                <a:spcPts val="1200"/>
+              </a:spcBef>
+              <a:spcAft>
+                <a:spcPts val="200"/>
+              </a:spcAft>
+              <a:buSzPct val="100000"/>
+              <a:buFont typeface="Arial" panose="020B0604020202020204" pitchFamily="34" charset="0"/>
+              <a:buChar char="•"/>
+            </a:pPr>
+            <a:r>
+              <a:rPr lang="pt-PT" sz="2400" dirty="0"/>
+              <a:t>Encontrar um tema útil e </a:t>
+            </a:r>
+            <a:r>
+              <a:rPr lang="pt-PT" sz="2400" dirty="0" smtClean="0"/>
+              <a:t>propício/adequado</a:t>
+            </a:r>
+            <a:endParaRPr lang="pt-PT" sz="2400" dirty="0"/>
+          </a:p>
+          <a:p>
+            <a:pPr marL="525780" lvl="2" indent="-342900">
+              <a:spcBef>
+                <a:spcPts val="1200"/>
+              </a:spcBef>
+              <a:spcAft>
+                <a:spcPts val="200"/>
+              </a:spcAft>
+              <a:buSzPct val="100000"/>
+              <a:buFont typeface="Arial" panose="020B0604020202020204" pitchFamily="34" charset="0"/>
+              <a:buChar char="•"/>
+            </a:pPr>
+            <a:r>
+              <a:rPr lang="pt-PT" sz="2400" dirty="0"/>
+              <a:t>Previsão </a:t>
+            </a:r>
+            <a:endParaRPr lang="pt-PT" sz="2400" dirty="0" smtClean="0"/>
+          </a:p>
+          <a:p>
+            <a:pPr marL="525780" lvl="2" indent="-342900">
+              <a:spcBef>
+                <a:spcPts val="1200"/>
+              </a:spcBef>
+              <a:spcAft>
+                <a:spcPts val="200"/>
+              </a:spcAft>
+              <a:buSzPct val="100000"/>
+              <a:buFont typeface="Arial" panose="020B0604020202020204" pitchFamily="34" charset="0"/>
+              <a:buChar char="•"/>
+            </a:pPr>
+            <a:endParaRPr lang="pt-PT" sz="2400" dirty="0"/>
+          </a:p>
+          <a:p>
+            <a:pPr marL="182880" lvl="2" indent="0">
+              <a:spcBef>
+                <a:spcPts val="1200"/>
+              </a:spcBef>
+              <a:spcAft>
+                <a:spcPts val="200"/>
+              </a:spcAft>
+              <a:buSzPct val="100000"/>
+              <a:buNone/>
+            </a:pPr>
+            <a:endParaRPr lang="pt-PT" sz="2400" dirty="0"/>
+          </a:p>
+          <a:p>
             <a:endParaRPr lang="pt-PT" dirty="0"/>
           </a:p>
         </p:txBody>

</xml_diff>